<commit_message>
Updated DREMS section - Component Execution Semantics and Temporal Partitioning
</commit_message>
<xml_diff>
--- a/src/proposal/figs/DREMS_COMPONENT_MODEL_EXECUTION_SEMANTICS.pptx
+++ b/src/proposal/figs/DREMS_COMPONENT_MODEL_EXECUTION_SEMANTICS.pptx
@@ -106,6 +106,22 @@
       </a:defRPr>
     </a:lvl9pPr>
   </p:defaultTextStyle>
+  <p:extLst>
+    <p:ext uri="{EFAFB233-063F-42B5-8137-9DF3F51BA10A}">
+      <p15:sldGuideLst xmlns:p15="http://schemas.microsoft.com/office/powerpoint/2012/main">
+        <p15:guide id="1" orient="horz" pos="2160">
+          <p15:clr>
+            <a:srgbClr val="A4A3A4"/>
+          </p15:clr>
+        </p15:guide>
+        <p15:guide id="2" pos="2880">
+          <p15:clr>
+            <a:srgbClr val="A4A3A4"/>
+          </p15:clr>
+        </p15:guide>
+      </p15:sldGuideLst>
+    </p:ext>
+  </p:extLst>
 </p:presentation>
 </file>
 
@@ -147,10 +163,9 @@
           <a:lstStyle/>
           <a:p>
             <a:r>
-              <a:rPr lang="en-US" smtClean="0"/>
+              <a:rPr lang="en-US"/>
               <a:t>Click to edit Master title style</a:t>
             </a:r>
-            <a:endParaRPr lang="en-US"/>
           </a:p>
         </p:txBody>
       </p:sp>
@@ -266,10 +281,9 @@
           </a:lstStyle>
           <a:p>
             <a:r>
-              <a:rPr lang="en-US" smtClean="0"/>
+              <a:rPr lang="en-US"/>
               <a:t>Click to edit Master subtitle style</a:t>
             </a:r>
-            <a:endParaRPr lang="en-US"/>
           </a:p>
         </p:txBody>
       </p:sp>
@@ -290,7 +304,7 @@
           <a:p>
             <a:fld id="{6E22DEBC-0F92-44C5-8820-6764BBEBBB00}" type="datetimeFigureOut">
               <a:rPr lang="en-US" smtClean="0"/>
-              <a:t>10/16/2015</a:t>
+              <a:t>5/6/2016</a:t>
             </a:fld>
             <a:endParaRPr lang="en-US"/>
           </a:p>
@@ -384,10 +398,9 @@
           <a:lstStyle/>
           <a:p>
             <a:r>
-              <a:rPr lang="en-US" smtClean="0"/>
+              <a:rPr lang="en-US"/>
               <a:t>Click to edit Master title style</a:t>
             </a:r>
-            <a:endParaRPr lang="en-US"/>
           </a:p>
         </p:txBody>
       </p:sp>
@@ -408,38 +421,37 @@
           <a:p>
             <a:pPr lvl="0"/>
             <a:r>
-              <a:rPr lang="en-US" smtClean="0"/>
+              <a:rPr lang="en-US"/>
               <a:t>Click to edit Master text styles</a:t>
             </a:r>
           </a:p>
           <a:p>
             <a:pPr lvl="1"/>
             <a:r>
-              <a:rPr lang="en-US" smtClean="0"/>
+              <a:rPr lang="en-US"/>
               <a:t>Second level</a:t>
             </a:r>
           </a:p>
           <a:p>
             <a:pPr lvl="2"/>
             <a:r>
-              <a:rPr lang="en-US" smtClean="0"/>
+              <a:rPr lang="en-US"/>
               <a:t>Third level</a:t>
             </a:r>
           </a:p>
           <a:p>
             <a:pPr lvl="3"/>
             <a:r>
-              <a:rPr lang="en-US" smtClean="0"/>
+              <a:rPr lang="en-US"/>
               <a:t>Fourth level</a:t>
             </a:r>
           </a:p>
           <a:p>
             <a:pPr lvl="4"/>
             <a:r>
-              <a:rPr lang="en-US" smtClean="0"/>
+              <a:rPr lang="en-US"/>
               <a:t>Fifth level</a:t>
             </a:r>
-            <a:endParaRPr lang="en-US"/>
           </a:p>
         </p:txBody>
       </p:sp>
@@ -460,7 +472,7 @@
           <a:p>
             <a:fld id="{6E22DEBC-0F92-44C5-8820-6764BBEBBB00}" type="datetimeFigureOut">
               <a:rPr lang="en-US" smtClean="0"/>
-              <a:t>10/16/2015</a:t>
+              <a:t>5/6/2016</a:t>
             </a:fld>
             <a:endParaRPr lang="en-US"/>
           </a:p>
@@ -559,10 +571,9 @@
           <a:lstStyle/>
           <a:p>
             <a:r>
-              <a:rPr lang="en-US" smtClean="0"/>
+              <a:rPr lang="en-US"/>
               <a:t>Click to edit Master title style</a:t>
             </a:r>
-            <a:endParaRPr lang="en-US"/>
           </a:p>
         </p:txBody>
       </p:sp>
@@ -588,38 +599,37 @@
           <a:p>
             <a:pPr lvl="0"/>
             <a:r>
-              <a:rPr lang="en-US" smtClean="0"/>
+              <a:rPr lang="en-US"/>
               <a:t>Click to edit Master text styles</a:t>
             </a:r>
           </a:p>
           <a:p>
             <a:pPr lvl="1"/>
             <a:r>
-              <a:rPr lang="en-US" smtClean="0"/>
+              <a:rPr lang="en-US"/>
               <a:t>Second level</a:t>
             </a:r>
           </a:p>
           <a:p>
             <a:pPr lvl="2"/>
             <a:r>
-              <a:rPr lang="en-US" smtClean="0"/>
+              <a:rPr lang="en-US"/>
               <a:t>Third level</a:t>
             </a:r>
           </a:p>
           <a:p>
             <a:pPr lvl="3"/>
             <a:r>
-              <a:rPr lang="en-US" smtClean="0"/>
+              <a:rPr lang="en-US"/>
               <a:t>Fourth level</a:t>
             </a:r>
           </a:p>
           <a:p>
             <a:pPr lvl="4"/>
             <a:r>
-              <a:rPr lang="en-US" smtClean="0"/>
+              <a:rPr lang="en-US"/>
               <a:t>Fifth level</a:t>
             </a:r>
-            <a:endParaRPr lang="en-US"/>
           </a:p>
         </p:txBody>
       </p:sp>
@@ -640,7 +650,7 @@
           <a:p>
             <a:fld id="{6E22DEBC-0F92-44C5-8820-6764BBEBBB00}" type="datetimeFigureOut">
               <a:rPr lang="en-US" smtClean="0"/>
-              <a:t>10/16/2015</a:t>
+              <a:t>5/6/2016</a:t>
             </a:fld>
             <a:endParaRPr lang="en-US"/>
           </a:p>
@@ -734,10 +744,9 @@
           <a:lstStyle/>
           <a:p>
             <a:r>
-              <a:rPr lang="en-US" smtClean="0"/>
+              <a:rPr lang="en-US"/>
               <a:t>Click to edit Master title style</a:t>
             </a:r>
-            <a:endParaRPr lang="en-US"/>
           </a:p>
         </p:txBody>
       </p:sp>
@@ -758,38 +767,37 @@
           <a:p>
             <a:pPr lvl="0"/>
             <a:r>
-              <a:rPr lang="en-US" smtClean="0"/>
+              <a:rPr lang="en-US"/>
               <a:t>Click to edit Master text styles</a:t>
             </a:r>
           </a:p>
           <a:p>
             <a:pPr lvl="1"/>
             <a:r>
-              <a:rPr lang="en-US" smtClean="0"/>
+              <a:rPr lang="en-US"/>
               <a:t>Second level</a:t>
             </a:r>
           </a:p>
           <a:p>
             <a:pPr lvl="2"/>
             <a:r>
-              <a:rPr lang="en-US" smtClean="0"/>
+              <a:rPr lang="en-US"/>
               <a:t>Third level</a:t>
             </a:r>
           </a:p>
           <a:p>
             <a:pPr lvl="3"/>
             <a:r>
-              <a:rPr lang="en-US" smtClean="0"/>
+              <a:rPr lang="en-US"/>
               <a:t>Fourth level</a:t>
             </a:r>
           </a:p>
           <a:p>
             <a:pPr lvl="4"/>
             <a:r>
-              <a:rPr lang="en-US" smtClean="0"/>
+              <a:rPr lang="en-US"/>
               <a:t>Fifth level</a:t>
             </a:r>
-            <a:endParaRPr lang="en-US"/>
           </a:p>
         </p:txBody>
       </p:sp>
@@ -810,7 +818,7 @@
           <a:p>
             <a:fld id="{6E22DEBC-0F92-44C5-8820-6764BBEBBB00}" type="datetimeFigureOut">
               <a:rPr lang="en-US" smtClean="0"/>
-              <a:t>10/16/2015</a:t>
+              <a:t>5/6/2016</a:t>
             </a:fld>
             <a:endParaRPr lang="en-US"/>
           </a:p>
@@ -913,10 +921,9 @@
           </a:lstStyle>
           <a:p>
             <a:r>
-              <a:rPr lang="en-US" smtClean="0"/>
+              <a:rPr lang="en-US"/>
               <a:t>Click to edit Master title style</a:t>
             </a:r>
-            <a:endParaRPr lang="en-US"/>
           </a:p>
         </p:txBody>
       </p:sp>
@@ -1033,7 +1040,7 @@
           <a:p>
             <a:pPr lvl="0"/>
             <a:r>
-              <a:rPr lang="en-US" smtClean="0"/>
+              <a:rPr lang="en-US"/>
               <a:t>Click to edit Master text styles</a:t>
             </a:r>
           </a:p>
@@ -1056,7 +1063,7 @@
           <a:p>
             <a:fld id="{6E22DEBC-0F92-44C5-8820-6764BBEBBB00}" type="datetimeFigureOut">
               <a:rPr lang="en-US" smtClean="0"/>
-              <a:t>10/16/2015</a:t>
+              <a:t>5/6/2016</a:t>
             </a:fld>
             <a:endParaRPr lang="en-US"/>
           </a:p>
@@ -1150,10 +1157,9 @@
           <a:lstStyle/>
           <a:p>
             <a:r>
-              <a:rPr lang="en-US" smtClean="0"/>
+              <a:rPr lang="en-US"/>
               <a:t>Click to edit Master title style</a:t>
             </a:r>
-            <a:endParaRPr lang="en-US"/>
           </a:p>
         </p:txBody>
       </p:sp>
@@ -1207,38 +1213,37 @@
           <a:p>
             <a:pPr lvl="0"/>
             <a:r>
-              <a:rPr lang="en-US" smtClean="0"/>
+              <a:rPr lang="en-US"/>
               <a:t>Click to edit Master text styles</a:t>
             </a:r>
           </a:p>
           <a:p>
             <a:pPr lvl="1"/>
             <a:r>
-              <a:rPr lang="en-US" smtClean="0"/>
+              <a:rPr lang="en-US"/>
               <a:t>Second level</a:t>
             </a:r>
           </a:p>
           <a:p>
             <a:pPr lvl="2"/>
             <a:r>
-              <a:rPr lang="en-US" smtClean="0"/>
+              <a:rPr lang="en-US"/>
               <a:t>Third level</a:t>
             </a:r>
           </a:p>
           <a:p>
             <a:pPr lvl="3"/>
             <a:r>
-              <a:rPr lang="en-US" smtClean="0"/>
+              <a:rPr lang="en-US"/>
               <a:t>Fourth level</a:t>
             </a:r>
           </a:p>
           <a:p>
             <a:pPr lvl="4"/>
             <a:r>
-              <a:rPr lang="en-US" smtClean="0"/>
+              <a:rPr lang="en-US"/>
               <a:t>Fifth level</a:t>
             </a:r>
-            <a:endParaRPr lang="en-US"/>
           </a:p>
         </p:txBody>
       </p:sp>
@@ -1292,38 +1297,37 @@
           <a:p>
             <a:pPr lvl="0"/>
             <a:r>
-              <a:rPr lang="en-US" smtClean="0"/>
+              <a:rPr lang="en-US"/>
               <a:t>Click to edit Master text styles</a:t>
             </a:r>
           </a:p>
           <a:p>
             <a:pPr lvl="1"/>
             <a:r>
-              <a:rPr lang="en-US" smtClean="0"/>
+              <a:rPr lang="en-US"/>
               <a:t>Second level</a:t>
             </a:r>
           </a:p>
           <a:p>
             <a:pPr lvl="2"/>
             <a:r>
-              <a:rPr lang="en-US" smtClean="0"/>
+              <a:rPr lang="en-US"/>
               <a:t>Third level</a:t>
             </a:r>
           </a:p>
           <a:p>
             <a:pPr lvl="3"/>
             <a:r>
-              <a:rPr lang="en-US" smtClean="0"/>
+              <a:rPr lang="en-US"/>
               <a:t>Fourth level</a:t>
             </a:r>
           </a:p>
           <a:p>
             <a:pPr lvl="4"/>
             <a:r>
-              <a:rPr lang="en-US" smtClean="0"/>
+              <a:rPr lang="en-US"/>
               <a:t>Fifth level</a:t>
             </a:r>
-            <a:endParaRPr lang="en-US"/>
           </a:p>
         </p:txBody>
       </p:sp>
@@ -1344,7 +1348,7 @@
           <a:p>
             <a:fld id="{6E22DEBC-0F92-44C5-8820-6764BBEBBB00}" type="datetimeFigureOut">
               <a:rPr lang="en-US" smtClean="0"/>
-              <a:t>10/16/2015</a:t>
+              <a:t>5/6/2016</a:t>
             </a:fld>
             <a:endParaRPr lang="en-US"/>
           </a:p>
@@ -1442,10 +1446,9 @@
           </a:lstStyle>
           <a:p>
             <a:r>
-              <a:rPr lang="en-US" smtClean="0"/>
+              <a:rPr lang="en-US"/>
               <a:t>Click to edit Master title style</a:t>
             </a:r>
-            <a:endParaRPr lang="en-US"/>
           </a:p>
         </p:txBody>
       </p:sp>
@@ -1508,7 +1511,7 @@
           <a:p>
             <a:pPr lvl="0"/>
             <a:r>
-              <a:rPr lang="en-US" smtClean="0"/>
+              <a:rPr lang="en-US"/>
               <a:t>Click to edit Master text styles</a:t>
             </a:r>
           </a:p>
@@ -1564,38 +1567,37 @@
           <a:p>
             <a:pPr lvl="0"/>
             <a:r>
-              <a:rPr lang="en-US" smtClean="0"/>
+              <a:rPr lang="en-US"/>
               <a:t>Click to edit Master text styles</a:t>
             </a:r>
           </a:p>
           <a:p>
             <a:pPr lvl="1"/>
             <a:r>
-              <a:rPr lang="en-US" smtClean="0"/>
+              <a:rPr lang="en-US"/>
               <a:t>Second level</a:t>
             </a:r>
           </a:p>
           <a:p>
             <a:pPr lvl="2"/>
             <a:r>
-              <a:rPr lang="en-US" smtClean="0"/>
+              <a:rPr lang="en-US"/>
               <a:t>Third level</a:t>
             </a:r>
           </a:p>
           <a:p>
             <a:pPr lvl="3"/>
             <a:r>
-              <a:rPr lang="en-US" smtClean="0"/>
+              <a:rPr lang="en-US"/>
               <a:t>Fourth level</a:t>
             </a:r>
           </a:p>
           <a:p>
             <a:pPr lvl="4"/>
             <a:r>
-              <a:rPr lang="en-US" smtClean="0"/>
+              <a:rPr lang="en-US"/>
               <a:t>Fifth level</a:t>
             </a:r>
-            <a:endParaRPr lang="en-US"/>
           </a:p>
         </p:txBody>
       </p:sp>
@@ -1658,7 +1660,7 @@
           <a:p>
             <a:pPr lvl="0"/>
             <a:r>
-              <a:rPr lang="en-US" smtClean="0"/>
+              <a:rPr lang="en-US"/>
               <a:t>Click to edit Master text styles</a:t>
             </a:r>
           </a:p>
@@ -1714,38 +1716,37 @@
           <a:p>
             <a:pPr lvl="0"/>
             <a:r>
-              <a:rPr lang="en-US" smtClean="0"/>
+              <a:rPr lang="en-US"/>
               <a:t>Click to edit Master text styles</a:t>
             </a:r>
           </a:p>
           <a:p>
             <a:pPr lvl="1"/>
             <a:r>
-              <a:rPr lang="en-US" smtClean="0"/>
+              <a:rPr lang="en-US"/>
               <a:t>Second level</a:t>
             </a:r>
           </a:p>
           <a:p>
             <a:pPr lvl="2"/>
             <a:r>
-              <a:rPr lang="en-US" smtClean="0"/>
+              <a:rPr lang="en-US"/>
               <a:t>Third level</a:t>
             </a:r>
           </a:p>
           <a:p>
             <a:pPr lvl="3"/>
             <a:r>
-              <a:rPr lang="en-US" smtClean="0"/>
+              <a:rPr lang="en-US"/>
               <a:t>Fourth level</a:t>
             </a:r>
           </a:p>
           <a:p>
             <a:pPr lvl="4"/>
             <a:r>
-              <a:rPr lang="en-US" smtClean="0"/>
+              <a:rPr lang="en-US"/>
               <a:t>Fifth level</a:t>
             </a:r>
-            <a:endParaRPr lang="en-US"/>
           </a:p>
         </p:txBody>
       </p:sp>
@@ -1766,7 +1767,7 @@
           <a:p>
             <a:fld id="{6E22DEBC-0F92-44C5-8820-6764BBEBBB00}" type="datetimeFigureOut">
               <a:rPr lang="en-US" smtClean="0"/>
-              <a:t>10/16/2015</a:t>
+              <a:t>5/6/2016</a:t>
             </a:fld>
             <a:endParaRPr lang="en-US"/>
           </a:p>
@@ -1860,10 +1861,9 @@
           <a:lstStyle/>
           <a:p>
             <a:r>
-              <a:rPr lang="en-US" smtClean="0"/>
+              <a:rPr lang="en-US"/>
               <a:t>Click to edit Master title style</a:t>
             </a:r>
-            <a:endParaRPr lang="en-US"/>
           </a:p>
         </p:txBody>
       </p:sp>
@@ -1884,7 +1884,7 @@
           <a:p>
             <a:fld id="{6E22DEBC-0F92-44C5-8820-6764BBEBBB00}" type="datetimeFigureOut">
               <a:rPr lang="en-US" smtClean="0"/>
-              <a:t>10/16/2015</a:t>
+              <a:t>5/6/2016</a:t>
             </a:fld>
             <a:endParaRPr lang="en-US"/>
           </a:p>
@@ -1979,7 +1979,7 @@
           <a:p>
             <a:fld id="{6E22DEBC-0F92-44C5-8820-6764BBEBBB00}" type="datetimeFigureOut">
               <a:rPr lang="en-US" smtClean="0"/>
-              <a:t>10/16/2015</a:t>
+              <a:t>5/6/2016</a:t>
             </a:fld>
             <a:endParaRPr lang="en-US"/>
           </a:p>
@@ -2082,10 +2082,9 @@
           </a:lstStyle>
           <a:p>
             <a:r>
-              <a:rPr lang="en-US" smtClean="0"/>
+              <a:rPr lang="en-US"/>
               <a:t>Click to edit Master title style</a:t>
             </a:r>
-            <a:endParaRPr lang="en-US"/>
           </a:p>
         </p:txBody>
       </p:sp>
@@ -2139,38 +2138,37 @@
           <a:p>
             <a:pPr lvl="0"/>
             <a:r>
-              <a:rPr lang="en-US" smtClean="0"/>
+              <a:rPr lang="en-US"/>
               <a:t>Click to edit Master text styles</a:t>
             </a:r>
           </a:p>
           <a:p>
             <a:pPr lvl="1"/>
             <a:r>
-              <a:rPr lang="en-US" smtClean="0"/>
+              <a:rPr lang="en-US"/>
               <a:t>Second level</a:t>
             </a:r>
           </a:p>
           <a:p>
             <a:pPr lvl="2"/>
             <a:r>
-              <a:rPr lang="en-US" smtClean="0"/>
+              <a:rPr lang="en-US"/>
               <a:t>Third level</a:t>
             </a:r>
           </a:p>
           <a:p>
             <a:pPr lvl="3"/>
             <a:r>
-              <a:rPr lang="en-US" smtClean="0"/>
+              <a:rPr lang="en-US"/>
               <a:t>Fourth level</a:t>
             </a:r>
           </a:p>
           <a:p>
             <a:pPr lvl="4"/>
             <a:r>
-              <a:rPr lang="en-US" smtClean="0"/>
+              <a:rPr lang="en-US"/>
               <a:t>Fifth level</a:t>
             </a:r>
-            <a:endParaRPr lang="en-US"/>
           </a:p>
         </p:txBody>
       </p:sp>
@@ -2233,7 +2231,7 @@
           <a:p>
             <a:pPr lvl="0"/>
             <a:r>
-              <a:rPr lang="en-US" smtClean="0"/>
+              <a:rPr lang="en-US"/>
               <a:t>Click to edit Master text styles</a:t>
             </a:r>
           </a:p>
@@ -2256,7 +2254,7 @@
           <a:p>
             <a:fld id="{6E22DEBC-0F92-44C5-8820-6764BBEBBB00}" type="datetimeFigureOut">
               <a:rPr lang="en-US" smtClean="0"/>
-              <a:t>10/16/2015</a:t>
+              <a:t>5/6/2016</a:t>
             </a:fld>
             <a:endParaRPr lang="en-US"/>
           </a:p>
@@ -2359,10 +2357,9 @@
           </a:lstStyle>
           <a:p>
             <a:r>
-              <a:rPr lang="en-US" smtClean="0"/>
+              <a:rPr lang="en-US"/>
               <a:t>Click to edit Master title style</a:t>
             </a:r>
-            <a:endParaRPr lang="en-US"/>
           </a:p>
         </p:txBody>
       </p:sp>
@@ -2486,7 +2483,7 @@
           <a:p>
             <a:pPr lvl="0"/>
             <a:r>
-              <a:rPr lang="en-US" smtClean="0"/>
+              <a:rPr lang="en-US"/>
               <a:t>Click to edit Master text styles</a:t>
             </a:r>
           </a:p>
@@ -2509,7 +2506,7 @@
           <a:p>
             <a:fld id="{6E22DEBC-0F92-44C5-8820-6764BBEBBB00}" type="datetimeFigureOut">
               <a:rPr lang="en-US" smtClean="0"/>
-              <a:t>10/16/2015</a:t>
+              <a:t>5/6/2016</a:t>
             </a:fld>
             <a:endParaRPr lang="en-US"/>
           </a:p>
@@ -2618,10 +2615,9 @@
           <a:lstStyle/>
           <a:p>
             <a:r>
-              <a:rPr lang="en-US" smtClean="0"/>
+              <a:rPr lang="en-US"/>
               <a:t>Click to edit Master title style</a:t>
             </a:r>
-            <a:endParaRPr lang="en-US"/>
           </a:p>
         </p:txBody>
       </p:sp>
@@ -2652,38 +2648,37 @@
           <a:p>
             <a:pPr lvl="0"/>
             <a:r>
-              <a:rPr lang="en-US" smtClean="0"/>
+              <a:rPr lang="en-US"/>
               <a:t>Click to edit Master text styles</a:t>
             </a:r>
           </a:p>
           <a:p>
             <a:pPr lvl="1"/>
             <a:r>
-              <a:rPr lang="en-US" smtClean="0"/>
+              <a:rPr lang="en-US"/>
               <a:t>Second level</a:t>
             </a:r>
           </a:p>
           <a:p>
             <a:pPr lvl="2"/>
             <a:r>
-              <a:rPr lang="en-US" smtClean="0"/>
+              <a:rPr lang="en-US"/>
               <a:t>Third level</a:t>
             </a:r>
           </a:p>
           <a:p>
             <a:pPr lvl="3"/>
             <a:r>
-              <a:rPr lang="en-US" smtClean="0"/>
+              <a:rPr lang="en-US"/>
               <a:t>Fourth level</a:t>
             </a:r>
           </a:p>
           <a:p>
             <a:pPr lvl="4"/>
             <a:r>
-              <a:rPr lang="en-US" smtClean="0"/>
+              <a:rPr lang="en-US"/>
               <a:t>Fifth level</a:t>
             </a:r>
-            <a:endParaRPr lang="en-US"/>
           </a:p>
         </p:txBody>
       </p:sp>
@@ -2722,7 +2717,7 @@
           <a:p>
             <a:fld id="{6E22DEBC-0F92-44C5-8820-6764BBEBBB00}" type="datetimeFigureOut">
               <a:rPr lang="en-US" smtClean="0"/>
-              <a:t>10/16/2015</a:t>
+              <a:t>5/6/2016</a:t>
             </a:fld>
             <a:endParaRPr lang="en-US"/>
           </a:p>
@@ -3248,10 +3243,9 @@
           <a:p>
             <a:pPr algn="ctr"/>
             <a:r>
-              <a:rPr lang="en-US" dirty="0" smtClean="0"/>
+              <a:rPr lang="en-US" dirty="0"/>
               <a:t>Current Operation</a:t>
             </a:r>
-            <a:endParaRPr lang="en-US" dirty="0"/>
           </a:p>
         </p:txBody>
       </p:sp>
@@ -3293,37 +3287,6 @@
       </p:cxnSp>
       <p:sp>
         <p:nvSpPr>
-          <p:cNvPr id="9" name="TextBox 8"/>
-          <p:cNvSpPr txBox="1"/>
-          <p:nvPr/>
-        </p:nvSpPr>
-        <p:spPr>
-          <a:xfrm>
-            <a:off x="3561150" y="2603033"/>
-            <a:ext cx="1046922" cy="338554"/>
-          </a:xfrm>
-          <a:prstGeom prst="rect">
-            <a:avLst/>
-          </a:prstGeom>
-          <a:noFill/>
-        </p:spPr>
-        <p:txBody>
-          <a:bodyPr wrap="square" rtlCol="0">
-            <a:spAutoFit/>
-          </a:bodyPr>
-          <a:lstStyle/>
-          <a:p>
-            <a:pPr algn="ctr"/>
-            <a:r>
-              <a:rPr lang="en-US" sz="800" b="1" dirty="0" smtClean="0"/>
-              <a:t>Remote request scheduled</a:t>
-            </a:r>
-            <a:endParaRPr lang="en-US" sz="800" b="1" dirty="0"/>
-          </a:p>
-        </p:txBody>
-      </p:sp>
-      <p:sp>
-        <p:nvSpPr>
           <p:cNvPr id="10" name="TextBox 9"/>
           <p:cNvSpPr txBox="1"/>
           <p:nvPr/>
@@ -3346,41 +3309,9 @@
           <a:p>
             <a:pPr algn="ctr"/>
             <a:r>
-              <a:rPr lang="en-US" sz="800" b="1" dirty="0" smtClean="0"/>
-              <a:t>Request from remote component</a:t>
-            </a:r>
-            <a:endParaRPr lang="en-US" sz="800" b="1" dirty="0"/>
-          </a:p>
-        </p:txBody>
-      </p:sp>
-      <p:sp>
-        <p:nvSpPr>
-          <p:cNvPr id="11" name="TextBox 10"/>
-          <p:cNvSpPr txBox="1"/>
-          <p:nvPr/>
-        </p:nvSpPr>
-        <p:spPr>
-          <a:xfrm>
-            <a:off x="1454551" y="3416890"/>
-            <a:ext cx="838200" cy="215444"/>
-          </a:xfrm>
-          <a:prstGeom prst="rect">
-            <a:avLst/>
-          </a:prstGeom>
-          <a:noFill/>
-        </p:spPr>
-        <p:txBody>
-          <a:bodyPr wrap="square" rtlCol="0">
-            <a:spAutoFit/>
-          </a:bodyPr>
-          <a:lstStyle/>
-          <a:p>
-            <a:pPr algn="ctr"/>
-            <a:r>
-              <a:rPr lang="en-US" sz="800" b="1" dirty="0" smtClean="0"/>
-              <a:t>0</a:t>
-            </a:r>
-            <a:endParaRPr lang="en-US" sz="800" b="1" dirty="0"/>
+              <a:rPr lang="en-US" sz="800" b="1" dirty="0"/>
+              <a:t>Arrival of Remote Request</a:t>
+            </a:r>
           </a:p>
         </p:txBody>
       </p:sp>
@@ -3408,49 +3339,12 @@
           <a:p>
             <a:pPr algn="ctr"/>
             <a:r>
-              <a:rPr lang="en-US" sz="800" b="1" dirty="0" smtClean="0"/>
+              <a:rPr lang="en-US" sz="800" b="1" dirty="0"/>
               <a:t>time</a:t>
             </a:r>
-            <a:endParaRPr lang="en-US" sz="800" b="1" dirty="0"/>
-          </a:p>
-        </p:txBody>
-      </p:sp>
-      <p:cxnSp>
-        <p:nvCxnSpPr>
-          <p:cNvPr id="13" name="Straight Arrow Connector 12"/>
-          <p:cNvCxnSpPr/>
-          <p:nvPr/>
-        </p:nvCxnSpPr>
-        <p:spPr>
-          <a:xfrm flipH="1" flipV="1">
-            <a:off x="3661811" y="3632334"/>
-            <a:ext cx="154940" cy="76200"/>
-          </a:xfrm>
-          <a:prstGeom prst="straightConnector1">
-            <a:avLst/>
-          </a:prstGeom>
-          <a:ln>
-            <a:solidFill>
-              <a:schemeClr val="tx1"/>
-            </a:solidFill>
-            <a:tailEnd type="stealth"/>
-          </a:ln>
-        </p:spPr>
-        <p:style>
-          <a:lnRef idx="1">
-            <a:schemeClr val="accent1"/>
-          </a:lnRef>
-          <a:fillRef idx="0">
-            <a:schemeClr val="accent1"/>
-          </a:fillRef>
-          <a:effectRef idx="0">
-            <a:schemeClr val="accent1"/>
-          </a:effectRef>
-          <a:fontRef idx="minor">
-            <a:schemeClr val="tx1"/>
-          </a:fontRef>
-        </p:style>
-      </p:cxnSp>
+          </a:p>
+        </p:txBody>
+      </p:sp>
       <p:sp>
         <p:nvSpPr>
           <p:cNvPr id="14" name="TextBox 13"/>
@@ -3459,7 +3353,7 @@
         </p:nvSpPr>
         <p:spPr>
           <a:xfrm>
-            <a:off x="3740551" y="3556134"/>
+            <a:off x="3239946" y="1970221"/>
             <a:ext cx="838200" cy="461665"/>
           </a:xfrm>
           <a:prstGeom prst="rect">
@@ -3475,10 +3369,9 @@
           <a:p>
             <a:pPr algn="ctr"/>
             <a:r>
-              <a:rPr lang="en-US" sz="800" b="1" dirty="0" smtClean="0"/>
-              <a:t>Local timer operation completed</a:t>
-            </a:r>
-            <a:endParaRPr lang="en-US" sz="800" b="1" dirty="0"/>
+              <a:rPr lang="en-US" sz="800" b="1" dirty="0"/>
+              <a:t>Remote Request Scheduled</a:t>
+            </a:r>
           </a:p>
         </p:txBody>
       </p:sp>
@@ -3522,85 +3415,16 @@
       </p:cxnSp>
       <p:cxnSp>
         <p:nvCxnSpPr>
-          <p:cNvPr id="16" name="Straight Connector 15"/>
+          <p:cNvPr id="18" name="Straight Arrow Connector 17"/>
           <p:cNvCxnSpPr>
-            <a:stCxn id="7" idx="0"/>
+            <a:stCxn id="14" idx="2"/>
           </p:cNvCxnSpPr>
           <p:nvPr/>
         </p:nvCxnSpPr>
         <p:spPr>
-          <a:xfrm flipV="1">
-            <a:off x="2785511" y="2722399"/>
-            <a:ext cx="154940" cy="195609"/>
-          </a:xfrm>
-          <a:prstGeom prst="line">
-            <a:avLst/>
-          </a:prstGeom>
-          <a:ln>
-            <a:prstDash val="sysDot"/>
-          </a:ln>
-        </p:spPr>
-        <p:style>
-          <a:lnRef idx="1">
-            <a:schemeClr val="accent1"/>
-          </a:lnRef>
-          <a:fillRef idx="0">
-            <a:schemeClr val="accent1"/>
-          </a:fillRef>
-          <a:effectRef idx="0">
-            <a:schemeClr val="accent1"/>
-          </a:effectRef>
-          <a:fontRef idx="minor">
-            <a:schemeClr val="tx1"/>
-          </a:fontRef>
-        </p:style>
-      </p:cxnSp>
-      <p:cxnSp>
-        <p:nvCxnSpPr>
-          <p:cNvPr id="17" name="Straight Connector 16"/>
-          <p:cNvCxnSpPr/>
-          <p:nvPr/>
-        </p:nvCxnSpPr>
-        <p:spPr>
           <a:xfrm>
-            <a:off x="2937911" y="2722399"/>
-            <a:ext cx="723900" cy="0"/>
-          </a:xfrm>
-          <a:prstGeom prst="line">
-            <a:avLst/>
-          </a:prstGeom>
-          <a:ln>
-            <a:solidFill>
-              <a:schemeClr val="tx1"/>
-            </a:solidFill>
-            <a:prstDash val="sysDot"/>
-          </a:ln>
-        </p:spPr>
-        <p:style>
-          <a:lnRef idx="1">
-            <a:schemeClr val="accent1"/>
-          </a:lnRef>
-          <a:fillRef idx="0">
-            <a:schemeClr val="accent1"/>
-          </a:fillRef>
-          <a:effectRef idx="0">
-            <a:schemeClr val="accent1"/>
-          </a:effectRef>
-          <a:fontRef idx="minor">
-            <a:schemeClr val="tx1"/>
-          </a:fontRef>
-        </p:style>
-      </p:cxnSp>
-      <p:cxnSp>
-        <p:nvCxnSpPr>
-          <p:cNvPr id="18" name="Straight Arrow Connector 17"/>
-          <p:cNvCxnSpPr/>
-          <p:nvPr/>
-        </p:nvCxnSpPr>
-        <p:spPr>
-          <a:xfrm>
-            <a:off x="3664351" y="2722399"/>
-            <a:ext cx="0" cy="195609"/>
+            <a:off x="3659046" y="2431886"/>
+            <a:ext cx="5305" cy="486122"/>
           </a:xfrm>
           <a:prstGeom prst="straightConnector1">
             <a:avLst/>
@@ -3609,7 +3433,7 @@
             <a:solidFill>
               <a:schemeClr val="tx1"/>
             </a:solidFill>
-            <a:prstDash val="sysDot"/>
+            <a:prstDash val="solid"/>
             <a:tailEnd type="stealth"/>
           </a:ln>
         </p:spPr>
@@ -3671,10 +3495,9 @@
           <a:p>
             <a:pPr algn="ctr"/>
             <a:r>
-              <a:rPr lang="en-US" dirty="0" smtClean="0"/>
+              <a:rPr lang="en-US" dirty="0"/>
               <a:t>Remote Request Processed</a:t>
             </a:r>
-            <a:endParaRPr lang="en-US" dirty="0"/>
           </a:p>
         </p:txBody>
       </p:sp>
@@ -3702,7 +3525,7 @@
           <a:p>
             <a:pPr algn="ctr"/>
             <a:r>
-              <a:rPr lang="en-US" sz="1200" b="1" dirty="0" smtClean="0">
+              <a:rPr lang="en-US" sz="1200" b="1" dirty="0">
                 <a:solidFill>
                   <a:srgbClr val="7030A0"/>
                 </a:solidFill>
@@ -3710,18 +3533,13 @@
               <a:t>t</a:t>
             </a:r>
             <a:r>
-              <a:rPr lang="en-US" sz="1200" b="1" baseline="-25000" dirty="0" smtClean="0">
+              <a:rPr lang="en-US" sz="1200" b="1" baseline="-25000" dirty="0">
                 <a:solidFill>
                   <a:srgbClr val="7030A0"/>
                 </a:solidFill>
               </a:rPr>
               <a:t>wait</a:t>
             </a:r>
-            <a:endParaRPr lang="en-US" sz="1200" b="1" baseline="-25000" dirty="0">
-              <a:solidFill>
-                <a:srgbClr val="7030A0"/>
-              </a:solidFill>
-            </a:endParaRPr>
           </a:p>
         </p:txBody>
       </p:sp>
@@ -3732,9 +3550,9 @@
           <p:nvPr/>
         </p:nvCxnSpPr>
         <p:spPr>
-          <a:xfrm flipH="1">
-            <a:off x="2785511" y="3780993"/>
-            <a:ext cx="154940" cy="3741"/>
+          <a:xfrm flipH="1" flipV="1">
+            <a:off x="2785511" y="3784734"/>
+            <a:ext cx="261621" cy="968"/>
           </a:xfrm>
           <a:prstGeom prst="straightConnector1">
             <a:avLst/>
@@ -3769,8 +3587,8 @@
         </p:nvCxnSpPr>
         <p:spPr>
           <a:xfrm>
-            <a:off x="3511951" y="3784734"/>
-            <a:ext cx="144780" cy="0"/>
+            <a:off x="3429000" y="3782863"/>
+            <a:ext cx="227731" cy="1871"/>
           </a:xfrm>
           <a:prstGeom prst="straightConnector1">
             <a:avLst/>
@@ -3805,7 +3623,7 @@
         </p:nvSpPr>
         <p:spPr>
           <a:xfrm>
-            <a:off x="3473851" y="2353066"/>
+            <a:off x="4350151" y="3613242"/>
             <a:ext cx="838200" cy="276999"/>
           </a:xfrm>
           <a:prstGeom prst="rect">
@@ -3821,7 +3639,7 @@
           <a:p>
             <a:pPr algn="ctr"/>
             <a:r>
-              <a:rPr lang="en-US" sz="1200" b="1" dirty="0" smtClean="0">
+              <a:rPr lang="en-US" sz="1200" b="1" dirty="0">
                 <a:solidFill>
                   <a:srgbClr val="7030A0"/>
                 </a:solidFill>
@@ -3829,18 +3647,13 @@
               <a:t>t</a:t>
             </a:r>
             <a:r>
-              <a:rPr lang="en-US" sz="1200" b="1" baseline="-25000" dirty="0" smtClean="0">
+              <a:rPr lang="en-US" sz="1200" b="1" baseline="-25000" dirty="0">
                 <a:solidFill>
                   <a:srgbClr val="7030A0"/>
                 </a:solidFill>
               </a:rPr>
               <a:t>exec</a:t>
             </a:r>
-            <a:endParaRPr lang="en-US" sz="1200" b="1" baseline="-25000" dirty="0">
-              <a:solidFill>
-                <a:srgbClr val="7030A0"/>
-              </a:solidFill>
-            </a:endParaRPr>
           </a:p>
         </p:txBody>
       </p:sp>
@@ -3852,8 +3665,8 @@
         </p:nvCxnSpPr>
         <p:spPr>
           <a:xfrm flipH="1">
-            <a:off x="2788051" y="2491565"/>
-            <a:ext cx="800100" cy="3741"/>
+            <a:off x="3664351" y="3783049"/>
+            <a:ext cx="923511" cy="2653"/>
           </a:xfrm>
           <a:prstGeom prst="straightConnector1">
             <a:avLst/>
@@ -3887,9 +3700,9 @@
           <p:nvPr/>
         </p:nvCxnSpPr>
         <p:spPr>
-          <a:xfrm>
-            <a:off x="4159651" y="2495306"/>
-            <a:ext cx="1790700" cy="0"/>
+          <a:xfrm flipV="1">
+            <a:off x="4953000" y="3775797"/>
+            <a:ext cx="997350" cy="5196"/>
           </a:xfrm>
           <a:prstGeom prst="straightConnector1">
             <a:avLst/>
@@ -4011,10 +3824,23 @@
           <a:p>
             <a:pPr algn="ctr"/>
             <a:r>
-              <a:rPr lang="en-US" sz="800" b="1" dirty="0" smtClean="0"/>
-              <a:t>Remote request processed</a:t>
-            </a:r>
-            <a:endParaRPr lang="en-US" sz="800" b="1" dirty="0"/>
+              <a:rPr lang="en-US" sz="800" b="1" dirty="0"/>
+              <a:t>Requested</a:t>
+            </a:r>
+          </a:p>
+          <a:p>
+            <a:pPr algn="ctr"/>
+            <a:r>
+              <a:rPr lang="en-US" sz="800" b="1" dirty="0"/>
+              <a:t>Operation</a:t>
+            </a:r>
+          </a:p>
+          <a:p>
+            <a:pPr algn="ctr"/>
+            <a:r>
+              <a:rPr lang="en-US" sz="800" b="1" dirty="0"/>
+              <a:t>Completed</a:t>
+            </a:r>
           </a:p>
         </p:txBody>
       </p:sp>
@@ -4026,7 +3852,7 @@
         </p:nvSpPr>
         <p:spPr>
           <a:xfrm>
-            <a:off x="1606951" y="2260734"/>
+            <a:off x="1510432" y="2268462"/>
             <a:ext cx="838200" cy="461665"/>
           </a:xfrm>
           <a:prstGeom prst="rect">
@@ -4042,10 +3868,9 @@
           <a:p>
             <a:pPr algn="ctr"/>
             <a:r>
-              <a:rPr lang="en-US" sz="800" b="1" dirty="0" smtClean="0"/>
-              <a:t>Local timer operation scheduled</a:t>
-            </a:r>
-            <a:endParaRPr lang="en-US" sz="800" b="1" dirty="0"/>
+              <a:rPr lang="en-US" sz="800" b="1" dirty="0"/>
+              <a:t>Some Operation Executing</a:t>
+            </a:r>
           </a:p>
         </p:txBody>
       </p:sp>
@@ -4057,8 +3882,8 @@
         </p:nvSpPr>
         <p:spPr>
           <a:xfrm>
-            <a:off x="3892951" y="2032134"/>
-            <a:ext cx="2057400" cy="320932"/>
+            <a:off x="4064400" y="2020064"/>
+            <a:ext cx="2774549" cy="320932"/>
           </a:xfrm>
           <a:prstGeom prst="rect">
             <a:avLst/>
@@ -4094,7 +3919,7 @@
           <a:p>
             <a:pPr algn="ctr"/>
             <a:r>
-              <a:rPr lang="en-US" sz="700" b="1" dirty="0" smtClean="0">
+              <a:rPr lang="en-US" sz="1000" b="1" dirty="0">
                 <a:solidFill>
                   <a:srgbClr val="7030A0"/>
                 </a:solidFill>
@@ -4102,7 +3927,7 @@
               <a:t>t</a:t>
             </a:r>
             <a:r>
-              <a:rPr lang="en-US" sz="700" b="1" baseline="-25000" dirty="0" smtClean="0">
+              <a:rPr lang="en-US" sz="1000" b="1" baseline="-25000" dirty="0">
                 <a:solidFill>
                   <a:srgbClr val="7030A0"/>
                 </a:solidFill>
@@ -4110,30 +3935,14 @@
               <a:t>wait</a:t>
             </a:r>
             <a:r>
-              <a:rPr lang="en-US" sz="700" b="1" dirty="0" smtClean="0">
+              <a:rPr lang="en-US" sz="1000" b="1" dirty="0">
                 <a:solidFill>
                   <a:srgbClr val="7030A0"/>
                 </a:solidFill>
               </a:rPr>
-              <a:t> </a:t>
-            </a:r>
-            <a:r>
-              <a:rPr lang="en-US" sz="700" b="1" dirty="0">
-                <a:solidFill>
-                  <a:srgbClr val="7030A0"/>
-                </a:solidFill>
-              </a:rPr>
-              <a:t>– </a:t>
-            </a:r>
-            <a:r>
-              <a:rPr lang="en-US" sz="700" b="1" dirty="0" smtClean="0">
-                <a:solidFill>
-                  <a:srgbClr val="7030A0"/>
-                </a:solidFill>
-              </a:rPr>
-              <a:t>Queue Waiting Time of Remote Request</a:t>
-            </a:r>
-            <a:endParaRPr lang="en-US" sz="700" dirty="0">
+              <a:t> – Queue Waiting Time of Remote Request</a:t>
+            </a:r>
+            <a:endParaRPr lang="en-US" sz="1000" dirty="0">
               <a:solidFill>
                 <a:schemeClr val="tx1"/>
               </a:solidFill>
@@ -4142,7 +3951,7 @@
           <a:p>
             <a:pPr algn="ctr"/>
             <a:r>
-              <a:rPr lang="en-US" sz="700" b="1" dirty="0" smtClean="0">
+              <a:rPr lang="en-US" sz="1000" b="1" dirty="0">
                 <a:solidFill>
                   <a:srgbClr val="7030A0"/>
                 </a:solidFill>
@@ -4150,7 +3959,7 @@
               <a:t>t</a:t>
             </a:r>
             <a:r>
-              <a:rPr lang="en-US" sz="700" b="1" baseline="-25000" dirty="0" smtClean="0">
+              <a:rPr lang="en-US" sz="1000" b="1" baseline="-25000" dirty="0">
                 <a:solidFill>
                   <a:srgbClr val="7030A0"/>
                 </a:solidFill>
@@ -4158,12 +3967,215 @@
               <a:t>exec</a:t>
             </a:r>
             <a:r>
-              <a:rPr lang="en-US" sz="700" b="1" dirty="0" smtClean="0">
+              <a:rPr lang="en-US" sz="1000" b="1" dirty="0">
                 <a:solidFill>
                   <a:srgbClr val="7030A0"/>
                 </a:solidFill>
               </a:rPr>
               <a:t> – Execution Time of Remote Request</a:t>
+            </a:r>
+          </a:p>
+        </p:txBody>
+      </p:sp>
+      <p:cxnSp>
+        <p:nvCxnSpPr>
+          <p:cNvPr id="31" name="Straight Connector 30"/>
+          <p:cNvCxnSpPr/>
+          <p:nvPr/>
+        </p:nvCxnSpPr>
+        <p:spPr>
+          <a:xfrm>
+            <a:off x="5950351" y="3546049"/>
+            <a:ext cx="0" cy="457200"/>
+          </a:xfrm>
+          <a:prstGeom prst="line">
+            <a:avLst/>
+          </a:prstGeom>
+          <a:ln>
+            <a:solidFill>
+              <a:schemeClr val="tx1"/>
+            </a:solidFill>
+          </a:ln>
+        </p:spPr>
+        <p:style>
+          <a:lnRef idx="1">
+            <a:schemeClr val="accent1"/>
+          </a:lnRef>
+          <a:fillRef idx="0">
+            <a:schemeClr val="accent1"/>
+          </a:fillRef>
+          <a:effectRef idx="0">
+            <a:schemeClr val="accent1"/>
+          </a:effectRef>
+          <a:fontRef idx="minor">
+            <a:schemeClr val="tx1"/>
+          </a:fontRef>
+        </p:style>
+      </p:cxnSp>
+      <p:sp>
+        <p:nvSpPr>
+          <p:cNvPr id="39" name="TextBox 38"/>
+          <p:cNvSpPr txBox="1"/>
+          <p:nvPr/>
+        </p:nvSpPr>
+        <p:spPr>
+          <a:xfrm>
+            <a:off x="2205941" y="2613904"/>
+            <a:ext cx="838200" cy="276999"/>
+          </a:xfrm>
+          <a:prstGeom prst="rect">
+            <a:avLst/>
+          </a:prstGeom>
+          <a:noFill/>
+        </p:spPr>
+        <p:txBody>
+          <a:bodyPr wrap="square" rtlCol="0">
+            <a:spAutoFit/>
+          </a:bodyPr>
+          <a:lstStyle/>
+          <a:p>
+            <a:pPr algn="ctr"/>
+            <a:r>
+              <a:rPr lang="en-US" sz="1200" b="1" dirty="0">
+                <a:solidFill>
+                  <a:srgbClr val="7030A0"/>
+                </a:solidFill>
+              </a:rPr>
+              <a:t>t</a:t>
+            </a:r>
+            <a:r>
+              <a:rPr lang="en-US" sz="1200" b="1" baseline="-25000" dirty="0">
+                <a:solidFill>
+                  <a:srgbClr val="7030A0"/>
+                </a:solidFill>
+              </a:rPr>
+              <a:t>req</a:t>
+            </a:r>
+          </a:p>
+        </p:txBody>
+      </p:sp>
+      <p:sp>
+        <p:nvSpPr>
+          <p:cNvPr id="40" name="TextBox 39"/>
+          <p:cNvSpPr txBox="1"/>
+          <p:nvPr/>
+        </p:nvSpPr>
+        <p:spPr>
+          <a:xfrm>
+            <a:off x="3511952" y="2620207"/>
+            <a:ext cx="838200" cy="276999"/>
+          </a:xfrm>
+          <a:prstGeom prst="rect">
+            <a:avLst/>
+          </a:prstGeom>
+          <a:noFill/>
+        </p:spPr>
+        <p:txBody>
+          <a:bodyPr wrap="square" rtlCol="0">
+            <a:spAutoFit/>
+          </a:bodyPr>
+          <a:lstStyle/>
+          <a:p>
+            <a:pPr algn="ctr"/>
+            <a:r>
+              <a:rPr lang="en-US" sz="1200" b="1" dirty="0">
+                <a:solidFill>
+                  <a:srgbClr val="7030A0"/>
+                </a:solidFill>
+              </a:rPr>
+              <a:t>t</a:t>
+            </a:r>
+            <a:r>
+              <a:rPr lang="en-US" sz="1200" b="1" baseline="-25000" dirty="0">
+                <a:solidFill>
+                  <a:srgbClr val="7030A0"/>
+                </a:solidFill>
+              </a:rPr>
+              <a:t>req_schld</a:t>
+            </a:r>
+          </a:p>
+        </p:txBody>
+      </p:sp>
+      <p:sp>
+        <p:nvSpPr>
+          <p:cNvPr id="41" name="TextBox 40"/>
+          <p:cNvSpPr txBox="1"/>
+          <p:nvPr/>
+        </p:nvSpPr>
+        <p:spPr>
+          <a:xfrm>
+            <a:off x="5264551" y="2625388"/>
+            <a:ext cx="838200" cy="276999"/>
+          </a:xfrm>
+          <a:prstGeom prst="rect">
+            <a:avLst/>
+          </a:prstGeom>
+          <a:noFill/>
+        </p:spPr>
+        <p:txBody>
+          <a:bodyPr wrap="square" rtlCol="0">
+            <a:spAutoFit/>
+          </a:bodyPr>
+          <a:lstStyle/>
+          <a:p>
+            <a:pPr algn="ctr"/>
+            <a:r>
+              <a:rPr lang="en-US" sz="1200" b="1" dirty="0">
+                <a:solidFill>
+                  <a:srgbClr val="7030A0"/>
+                </a:solidFill>
+              </a:rPr>
+              <a:t>t</a:t>
+            </a:r>
+            <a:r>
+              <a:rPr lang="en-US" sz="1200" b="1" baseline="-25000" dirty="0">
+                <a:solidFill>
+                  <a:srgbClr val="7030A0"/>
+                </a:solidFill>
+              </a:rPr>
+              <a:t>req_cmpl</a:t>
+            </a:r>
+          </a:p>
+        </p:txBody>
+      </p:sp>
+      <p:sp>
+        <p:nvSpPr>
+          <p:cNvPr id="44" name="TextBox 43"/>
+          <p:cNvSpPr txBox="1"/>
+          <p:nvPr/>
+        </p:nvSpPr>
+        <p:spPr>
+          <a:xfrm>
+            <a:off x="1523920" y="3550431"/>
+            <a:ext cx="838200" cy="276999"/>
+          </a:xfrm>
+          <a:prstGeom prst="rect">
+            <a:avLst/>
+          </a:prstGeom>
+          <a:noFill/>
+        </p:spPr>
+        <p:txBody>
+          <a:bodyPr wrap="square" rtlCol="0">
+            <a:spAutoFit/>
+          </a:bodyPr>
+          <a:lstStyle/>
+          <a:p>
+            <a:pPr algn="ctr"/>
+            <a:r>
+              <a:rPr lang="en-US" sz="1200" b="1" dirty="0">
+                <a:solidFill>
+                  <a:srgbClr val="7030A0"/>
+                </a:solidFill>
+              </a:rPr>
+              <a:t>t</a:t>
+            </a:r>
+            <a:r>
+              <a:rPr lang="en-US" sz="1200" b="1" baseline="-25000" dirty="0">
+                <a:solidFill>
+                  <a:srgbClr val="7030A0"/>
+                </a:solidFill>
+              </a:rPr>
+              <a:t>i</a:t>
             </a:r>
           </a:p>
         </p:txBody>
@@ -4243,18 +4255,13 @@
           <a:p>
             <a:pPr algn="ctr"/>
             <a:r>
-              <a:rPr lang="en-US" sz="1200" b="1" dirty="0" smtClean="0">
+              <a:rPr lang="en-US" sz="1200" b="1" dirty="0">
                 <a:solidFill>
                   <a:schemeClr val="tx1"/>
                 </a:solidFill>
               </a:rPr>
               <a:t>Component-based Design Model of Application</a:t>
             </a:r>
-            <a:endParaRPr lang="en-US" sz="1200" b="1" dirty="0">
-              <a:solidFill>
-                <a:schemeClr val="tx1"/>
-              </a:solidFill>
-            </a:endParaRPr>
           </a:p>
         </p:txBody>
       </p:sp>
@@ -4303,18 +4310,13 @@
           <a:p>
             <a:pPr algn="ctr"/>
             <a:r>
-              <a:rPr lang="en-US" sz="1200" b="1" dirty="0" smtClean="0">
+              <a:rPr lang="en-US" sz="1200" b="1" dirty="0">
                 <a:solidFill>
                   <a:schemeClr val="tx1"/>
                 </a:solidFill>
               </a:rPr>
               <a:t>Timing Analysis Model</a:t>
             </a:r>
-            <a:endParaRPr lang="en-US" sz="1200" b="1" dirty="0">
-              <a:solidFill>
-                <a:schemeClr val="tx1"/>
-              </a:solidFill>
-            </a:endParaRPr>
           </a:p>
         </p:txBody>
       </p:sp>
@@ -4478,18 +4480,13 @@
           <a:p>
             <a:pPr algn="ctr"/>
             <a:r>
-              <a:rPr lang="en-US" sz="1200" b="1" dirty="0" smtClean="0">
+              <a:rPr lang="en-US" sz="1200" b="1" dirty="0">
                 <a:solidFill>
                   <a:schemeClr val="tx1"/>
                 </a:solidFill>
               </a:rPr>
               <a:t>Deployment Plan and Infrastructure Code</a:t>
             </a:r>
-            <a:endParaRPr lang="en-US" sz="1200" b="1" dirty="0">
-              <a:solidFill>
-                <a:schemeClr val="tx1"/>
-              </a:solidFill>
-            </a:endParaRPr>
           </a:p>
         </p:txBody>
       </p:sp>
@@ -4574,18 +4571,13 @@
           <a:p>
             <a:pPr algn="ctr"/>
             <a:r>
-              <a:rPr lang="en-US" sz="1200" b="1" dirty="0" smtClean="0">
+              <a:rPr lang="en-US" sz="1200" b="1" dirty="0">
                 <a:solidFill>
                   <a:schemeClr val="tx1"/>
                 </a:solidFill>
               </a:rPr>
               <a:t>Mission-critical Distributed Real-time Embedded System</a:t>
             </a:r>
-            <a:endParaRPr lang="en-US" sz="1200" b="1" dirty="0">
-              <a:solidFill>
-                <a:schemeClr val="tx1"/>
-              </a:solidFill>
-            </a:endParaRPr>
           </a:p>
         </p:txBody>
       </p:sp>
@@ -4688,10 +4680,9 @@
           <a:p>
             <a:pPr algn="ctr"/>
             <a:r>
-              <a:rPr lang="en-US" sz="1200" b="1" dirty="0" smtClean="0"/>
+              <a:rPr lang="en-US" sz="1200" b="1" dirty="0"/>
               <a:t>Generate</a:t>
             </a:r>
-            <a:endParaRPr lang="en-US" sz="1200" b="1" dirty="0"/>
           </a:p>
         </p:txBody>
       </p:sp>
@@ -4719,10 +4710,9 @@
           <a:p>
             <a:pPr algn="ctr"/>
             <a:r>
-              <a:rPr lang="en-US" sz="1200" b="1" dirty="0" smtClean="0"/>
+              <a:rPr lang="en-US" sz="1200" b="1" dirty="0"/>
               <a:t>Refine/Restructure</a:t>
             </a:r>
-            <a:endParaRPr lang="en-US" sz="1200" b="1" dirty="0"/>
           </a:p>
         </p:txBody>
       </p:sp>
@@ -4750,10 +4740,9 @@
           <a:p>
             <a:pPr algn="ctr"/>
             <a:r>
-              <a:rPr lang="en-US" sz="1200" b="1" i="1" dirty="0" smtClean="0"/>
+              <a:rPr lang="en-US" sz="1200" b="1" i="1" dirty="0"/>
               <a:t>models</a:t>
             </a:r>
-            <a:endParaRPr lang="en-US" sz="1200" b="1" i="1" dirty="0"/>
           </a:p>
         </p:txBody>
       </p:sp>
@@ -4781,10 +4770,9 @@
           <a:p>
             <a:pPr algn="ctr"/>
             <a:r>
-              <a:rPr lang="en-US" sz="1200" b="1" dirty="0" smtClean="0"/>
+              <a:rPr lang="en-US" sz="1200" b="1" dirty="0"/>
               <a:t>Deploy</a:t>
             </a:r>
-            <a:endParaRPr lang="en-US" sz="1200" b="1" dirty="0"/>
           </a:p>
         </p:txBody>
       </p:sp>
@@ -4812,10 +4800,9 @@
           <a:p>
             <a:pPr algn="ctr"/>
             <a:r>
-              <a:rPr lang="en-US" sz="1200" b="1" dirty="0" smtClean="0"/>
+              <a:rPr lang="en-US" sz="1200" b="1" dirty="0"/>
               <a:t>Generate</a:t>
             </a:r>
-            <a:endParaRPr lang="en-US" sz="1200" b="1" dirty="0"/>
           </a:p>
         </p:txBody>
       </p:sp>
@@ -4843,10 +4830,9 @@
           <a:p>
             <a:pPr algn="ctr"/>
             <a:r>
-              <a:rPr lang="en-US" sz="1200" b="1" dirty="0" smtClean="0"/>
+              <a:rPr lang="en-US" sz="1200" b="1" dirty="0"/>
               <a:t>Design-time</a:t>
             </a:r>
-            <a:endParaRPr lang="en-US" sz="1200" b="1" dirty="0"/>
           </a:p>
         </p:txBody>
       </p:sp>
@@ -4874,10 +4860,9 @@
           <a:p>
             <a:pPr algn="ctr"/>
             <a:r>
-              <a:rPr lang="en-US" sz="1200" b="1" dirty="0" smtClean="0"/>
+              <a:rPr lang="en-US" sz="1200" b="1" dirty="0"/>
               <a:t>Run-time</a:t>
             </a:r>
-            <a:endParaRPr lang="en-US" sz="1200" b="1" dirty="0"/>
           </a:p>
         </p:txBody>
       </p:sp>
@@ -4989,7 +4974,7 @@
                   <a:defRPr/>
                 </a:pPr>
                 <a:r>
-                  <a:rPr kumimoji="0" lang="en-US" sz="2000" b="1" i="0" u="none" strike="noStrike" kern="0" cap="none" spc="0" normalizeH="0" baseline="0" noProof="0" dirty="0" smtClean="0">
+                  <a:rPr kumimoji="0" lang="en-US" sz="2000" b="1" i="0" u="none" strike="noStrike" kern="0" cap="none" spc="0" normalizeH="0" baseline="0" noProof="0" dirty="0">
                     <a:ln>
                       <a:noFill/>
                     </a:ln>
@@ -5058,7 +5043,7 @@
                   <a:defRPr/>
                 </a:pPr>
                 <a:r>
-                  <a:rPr kumimoji="0" lang="en-US" sz="2000" b="1" i="0" u="none" strike="noStrike" kern="0" cap="none" spc="0" normalizeH="0" baseline="0" noProof="0" dirty="0" smtClean="0">
+                  <a:rPr kumimoji="0" lang="en-US" sz="2000" b="1" i="0" u="none" strike="noStrike" kern="0" cap="none" spc="0" normalizeH="0" baseline="0" noProof="0" dirty="0">
                     <a:ln>
                       <a:noFill/>
                     </a:ln>
@@ -5124,7 +5109,7 @@
                   <a:defRPr/>
                 </a:pPr>
                 <a:r>
-                  <a:rPr kumimoji="0" lang="en-US" sz="2000" b="1" i="0" u="none" strike="noStrike" kern="0" cap="none" spc="0" normalizeH="0" baseline="0" noProof="0" dirty="0" smtClean="0">
+                  <a:rPr kumimoji="0" lang="en-US" sz="2000" b="1" i="0" u="none" strike="noStrike" kern="0" cap="none" spc="0" normalizeH="0" baseline="0" noProof="0" dirty="0">
                     <a:ln>
                       <a:noFill/>
                     </a:ln>
@@ -5139,7 +5124,7 @@
                   <a:t>			                     Operating</a:t>
                 </a:r>
                 <a:r>
-                  <a:rPr kumimoji="0" lang="en-US" sz="2000" b="1" i="0" u="none" strike="noStrike" kern="0" cap="none" spc="0" normalizeH="0" noProof="0" dirty="0" smtClean="0">
+                  <a:rPr kumimoji="0" lang="en-US" sz="2000" b="1" i="0" u="none" strike="noStrike" kern="0" cap="none" spc="0" normalizeH="0" noProof="0" dirty="0">
                     <a:ln>
                       <a:noFill/>
                     </a:ln>
@@ -5153,7 +5138,7 @@
                   </a:rPr>
                   <a:t> System</a:t>
                 </a:r>
-                <a:endParaRPr kumimoji="0" lang="en-US" sz="2000" b="1" i="0" u="none" strike="noStrike" kern="0" cap="none" spc="0" normalizeH="0" baseline="0" noProof="0" dirty="0" smtClean="0">
+                <a:endParaRPr kumimoji="0" lang="en-US" sz="2000" b="1" i="0" u="none" strike="noStrike" kern="0" cap="none" spc="0" normalizeH="0" baseline="0" noProof="0" dirty="0">
                   <a:ln>
                     <a:noFill/>
                   </a:ln>
@@ -5217,7 +5202,7 @@
                   <a:defRPr/>
                 </a:pPr>
                 <a:r>
-                  <a:rPr kumimoji="0" lang="en-US" sz="1600" b="1" i="0" u="none" strike="noStrike" kern="0" cap="none" spc="0" normalizeH="0" baseline="0" noProof="0" dirty="0" smtClean="0">
+                  <a:rPr kumimoji="0" lang="en-US" sz="1600" b="1" i="0" u="none" strike="noStrike" kern="0" cap="none" spc="0" normalizeH="0" baseline="0" noProof="0" dirty="0">
                     <a:ln>
                       <a:noFill/>
                     </a:ln>
@@ -5283,7 +5268,7 @@
                   <a:defRPr/>
                 </a:pPr>
                 <a:r>
-                  <a:rPr kumimoji="0" lang="en-US" sz="2000" b="1" i="0" u="none" strike="noStrike" kern="0" cap="none" spc="0" normalizeH="0" baseline="0" noProof="0" dirty="0" smtClean="0">
+                  <a:rPr kumimoji="0" lang="en-US" sz="2000" b="1" i="0" u="none" strike="noStrike" kern="0" cap="none" spc="0" normalizeH="0" baseline="0" noProof="0" dirty="0">
                     <a:ln>
                       <a:noFill/>
                     </a:ln>
@@ -5349,7 +5334,7 @@
                   <a:defRPr/>
                 </a:pPr>
                 <a:r>
-                  <a:rPr kumimoji="0" lang="en-US" sz="2000" b="1" i="0" u="none" strike="noStrike" kern="0" cap="none" spc="0" normalizeH="0" baseline="0" noProof="0" dirty="0" smtClean="0">
+                  <a:rPr kumimoji="0" lang="en-US" sz="2000" b="1" i="0" u="none" strike="noStrike" kern="0" cap="none" spc="0" normalizeH="0" baseline="0" noProof="0" dirty="0">
                     <a:ln>
                       <a:noFill/>
                     </a:ln>
@@ -5415,7 +5400,7 @@
                   <a:defRPr/>
                 </a:pPr>
                 <a:r>
-                  <a:rPr kumimoji="0" lang="en-US" sz="2000" b="1" i="0" u="none" strike="noStrike" kern="0" cap="none" spc="0" normalizeH="0" baseline="0" noProof="0" dirty="0" smtClean="0">
+                  <a:rPr kumimoji="0" lang="en-US" sz="2000" b="1" i="0" u="none" strike="noStrike" kern="0" cap="none" spc="0" normalizeH="0" baseline="0" noProof="0" dirty="0">
                     <a:ln>
                       <a:noFill/>
                     </a:ln>
@@ -5478,7 +5463,7 @@
                   <a:tabLst/>
                   <a:defRPr/>
                 </a:pPr>
-                <a:endParaRPr kumimoji="0" lang="en-US" sz="2000" b="1" i="0" u="none" strike="noStrike" kern="0" cap="none" spc="0" normalizeH="0" baseline="0" noProof="0" dirty="0" smtClean="0">
+                <a:endParaRPr kumimoji="0" lang="en-US" sz="2000" b="1" i="0" u="none" strike="noStrike" kern="0" cap="none" spc="0" normalizeH="0" baseline="0" noProof="0" dirty="0">
                   <a:ln>
                     <a:noFill/>
                   </a:ln>
@@ -5539,7 +5524,7 @@
                   <a:tabLst/>
                   <a:defRPr/>
                 </a:pPr>
-                <a:endParaRPr kumimoji="0" lang="en-US" sz="2000" b="1" i="0" u="none" strike="noStrike" kern="0" cap="none" spc="0" normalizeH="0" baseline="0" noProof="0" dirty="0" smtClean="0">
+                <a:endParaRPr kumimoji="0" lang="en-US" sz="2000" b="1" i="0" u="none" strike="noStrike" kern="0" cap="none" spc="0" normalizeH="0" baseline="0" noProof="0" dirty="0">
                   <a:ln>
                     <a:noFill/>
                   </a:ln>
@@ -5600,7 +5585,7 @@
                   <a:tabLst/>
                   <a:defRPr/>
                 </a:pPr>
-                <a:endParaRPr kumimoji="0" lang="en-US" sz="2000" b="1" i="0" u="none" strike="noStrike" kern="0" cap="none" spc="0" normalizeH="0" baseline="0" noProof="0" dirty="0" smtClean="0">
+                <a:endParaRPr kumimoji="0" lang="en-US" sz="2000" b="1" i="0" u="none" strike="noStrike" kern="0" cap="none" spc="0" normalizeH="0" baseline="0" noProof="0" dirty="0">
                   <a:ln>
                     <a:noFill/>
                   </a:ln>
@@ -5664,7 +5649,7 @@
                   <a:defRPr/>
                 </a:pPr>
                 <a:r>
-                  <a:rPr kumimoji="0" lang="en-US" sz="2000" b="1" i="0" u="none" strike="noStrike" kern="0" cap="none" spc="0" normalizeH="0" baseline="0" noProof="0" dirty="0" smtClean="0">
+                  <a:rPr kumimoji="0" lang="en-US" sz="2000" b="1" i="0" u="none" strike="noStrike" kern="0" cap="none" spc="0" normalizeH="0" baseline="0" noProof="0" dirty="0">
                     <a:ln>
                       <a:noFill/>
                     </a:ln>
@@ -5727,7 +5712,7 @@
                   <a:tabLst/>
                   <a:defRPr/>
                 </a:pPr>
-                <a:endParaRPr kumimoji="0" lang="en-US" sz="2000" b="1" i="0" u="none" strike="noStrike" kern="0" cap="none" spc="0" normalizeH="0" baseline="0" noProof="0" dirty="0" smtClean="0">
+                <a:endParaRPr kumimoji="0" lang="en-US" sz="2000" b="1" i="0" u="none" strike="noStrike" kern="0" cap="none" spc="0" normalizeH="0" baseline="0" noProof="0" dirty="0">
                   <a:ln>
                     <a:noFill/>
                   </a:ln>
@@ -5791,7 +5776,7 @@
                   <a:defRPr/>
                 </a:pPr>
                 <a:r>
-                  <a:rPr kumimoji="0" lang="en-US" sz="2000" b="1" i="0" u="none" strike="noStrike" kern="0" cap="none" spc="0" normalizeH="0" baseline="0" noProof="0" dirty="0" smtClean="0">
+                  <a:rPr kumimoji="0" lang="en-US" sz="2000" b="1" i="0" u="none" strike="noStrike" kern="0" cap="none" spc="0" normalizeH="0" baseline="0" noProof="0" dirty="0">
                     <a:ln>
                       <a:noFill/>
                     </a:ln>
@@ -5854,7 +5839,7 @@
                   <a:tabLst/>
                   <a:defRPr/>
                 </a:pPr>
-                <a:endParaRPr kumimoji="0" lang="en-US" sz="2000" b="1" i="0" u="none" strike="noStrike" kern="0" cap="none" spc="0" normalizeH="0" baseline="0" noProof="0" dirty="0" smtClean="0">
+                <a:endParaRPr kumimoji="0" lang="en-US" sz="2000" b="1" i="0" u="none" strike="noStrike" kern="0" cap="none" spc="0" normalizeH="0" baseline="0" noProof="0" dirty="0">
                   <a:ln>
                     <a:noFill/>
                   </a:ln>
@@ -6042,7 +6027,7 @@
                   <a:defRPr/>
                 </a:pPr>
                 <a:r>
-                  <a:rPr kumimoji="0" lang="en-US" sz="2000" b="1" i="0" u="none" strike="noStrike" kern="0" cap="none" spc="0" normalizeH="0" baseline="0" noProof="0" dirty="0" smtClean="0">
+                  <a:rPr kumimoji="0" lang="en-US" sz="2000" b="1" i="0" u="none" strike="noStrike" kern="0" cap="none" spc="0" normalizeH="0" baseline="0" noProof="0" dirty="0">
                     <a:ln>
                       <a:noFill/>
                     </a:ln>
@@ -6108,7 +6093,7 @@
                   <a:defRPr/>
                 </a:pPr>
                 <a:r>
-                  <a:rPr kumimoji="0" lang="en-US" sz="2000" b="1" i="0" u="none" strike="noStrike" kern="0" cap="none" spc="0" normalizeH="0" baseline="0" noProof="0" dirty="0" smtClean="0">
+                  <a:rPr kumimoji="0" lang="en-US" sz="2000" b="1" i="0" u="none" strike="noStrike" kern="0" cap="none" spc="0" normalizeH="0" baseline="0" noProof="0" dirty="0">
                     <a:ln>
                       <a:noFill/>
                     </a:ln>
@@ -6174,7 +6159,7 @@
                   <a:defRPr/>
                 </a:pPr>
                 <a:r>
-                  <a:rPr kumimoji="0" lang="en-US" sz="2000" b="1" i="0" u="none" strike="noStrike" kern="0" cap="none" spc="0" normalizeH="0" baseline="0" noProof="0" dirty="0" smtClean="0">
+                  <a:rPr kumimoji="0" lang="en-US" sz="2000" b="1" i="0" u="none" strike="noStrike" kern="0" cap="none" spc="0" normalizeH="0" baseline="0" noProof="0" dirty="0">
                     <a:ln>
                       <a:noFill/>
                     </a:ln>

</xml_diff>